<commit_message>
Carried on with Power BI and Finished SQL
</commit_message>
<xml_diff>
--- a/Outputs/Backgrounds.pptx
+++ b/Outputs/Backgrounds.pptx
@@ -5140,7 +5140,7 @@
           <a:p>
             <a:fld id="{B8F9F58D-54D6-49D3-825B-81C29B586EBC}" type="datetimeFigureOut">
               <a:rPr lang="en-ZA" smtClean="0"/>
-              <a:t>2025/10/09</a:t>
+              <a:t>2025/10/10</a:t>
             </a:fld>
             <a:endParaRPr lang="en-ZA"/>
           </a:p>
@@ -5340,7 +5340,7 @@
           <a:p>
             <a:fld id="{B8F9F58D-54D6-49D3-825B-81C29B586EBC}" type="datetimeFigureOut">
               <a:rPr lang="en-ZA" smtClean="0"/>
-              <a:t>2025/10/09</a:t>
+              <a:t>2025/10/10</a:t>
             </a:fld>
             <a:endParaRPr lang="en-ZA"/>
           </a:p>
@@ -5550,7 +5550,7 @@
           <a:p>
             <a:fld id="{B8F9F58D-54D6-49D3-825B-81C29B586EBC}" type="datetimeFigureOut">
               <a:rPr lang="en-ZA" smtClean="0"/>
-              <a:t>2025/10/09</a:t>
+              <a:t>2025/10/10</a:t>
             </a:fld>
             <a:endParaRPr lang="en-ZA"/>
           </a:p>
@@ -5750,7 +5750,7 @@
           <a:p>
             <a:fld id="{B8F9F58D-54D6-49D3-825B-81C29B586EBC}" type="datetimeFigureOut">
               <a:rPr lang="en-ZA" smtClean="0"/>
-              <a:t>2025/10/09</a:t>
+              <a:t>2025/10/10</a:t>
             </a:fld>
             <a:endParaRPr lang="en-ZA"/>
           </a:p>
@@ -6026,7 +6026,7 @@
           <a:p>
             <a:fld id="{B8F9F58D-54D6-49D3-825B-81C29B586EBC}" type="datetimeFigureOut">
               <a:rPr lang="en-ZA" smtClean="0"/>
-              <a:t>2025/10/09</a:t>
+              <a:t>2025/10/10</a:t>
             </a:fld>
             <a:endParaRPr lang="en-ZA"/>
           </a:p>
@@ -6294,7 +6294,7 @@
           <a:p>
             <a:fld id="{B8F9F58D-54D6-49D3-825B-81C29B586EBC}" type="datetimeFigureOut">
               <a:rPr lang="en-ZA" smtClean="0"/>
-              <a:t>2025/10/09</a:t>
+              <a:t>2025/10/10</a:t>
             </a:fld>
             <a:endParaRPr lang="en-ZA"/>
           </a:p>
@@ -6709,7 +6709,7 @@
           <a:p>
             <a:fld id="{B8F9F58D-54D6-49D3-825B-81C29B586EBC}" type="datetimeFigureOut">
               <a:rPr lang="en-ZA" smtClean="0"/>
-              <a:t>2025/10/09</a:t>
+              <a:t>2025/10/10</a:t>
             </a:fld>
             <a:endParaRPr lang="en-ZA"/>
           </a:p>
@@ -6851,7 +6851,7 @@
           <a:p>
             <a:fld id="{B8F9F58D-54D6-49D3-825B-81C29B586EBC}" type="datetimeFigureOut">
               <a:rPr lang="en-ZA" smtClean="0"/>
-              <a:t>2025/10/09</a:t>
+              <a:t>2025/10/10</a:t>
             </a:fld>
             <a:endParaRPr lang="en-ZA"/>
           </a:p>
@@ -6964,7 +6964,7 @@
           <a:p>
             <a:fld id="{B8F9F58D-54D6-49D3-825B-81C29B586EBC}" type="datetimeFigureOut">
               <a:rPr lang="en-ZA" smtClean="0"/>
-              <a:t>2025/10/09</a:t>
+              <a:t>2025/10/10</a:t>
             </a:fld>
             <a:endParaRPr lang="en-ZA"/>
           </a:p>
@@ -7277,7 +7277,7 @@
           <a:p>
             <a:fld id="{B8F9F58D-54D6-49D3-825B-81C29B586EBC}" type="datetimeFigureOut">
               <a:rPr lang="en-ZA" smtClean="0"/>
-              <a:t>2025/10/09</a:t>
+              <a:t>2025/10/10</a:t>
             </a:fld>
             <a:endParaRPr lang="en-ZA"/>
           </a:p>
@@ -7566,7 +7566,7 @@
           <a:p>
             <a:fld id="{B8F9F58D-54D6-49D3-825B-81C29B586EBC}" type="datetimeFigureOut">
               <a:rPr lang="en-ZA" smtClean="0"/>
-              <a:t>2025/10/09</a:t>
+              <a:t>2025/10/10</a:t>
             </a:fld>
             <a:endParaRPr lang="en-ZA"/>
           </a:p>
@@ -7809,7 +7809,7 @@
           <a:p>
             <a:fld id="{B8F9F58D-54D6-49D3-825B-81C29B586EBC}" type="datetimeFigureOut">
               <a:rPr lang="en-ZA" smtClean="0"/>
-              <a:t>2025/10/09</a:t>
+              <a:t>2025/10/10</a:t>
             </a:fld>
             <a:endParaRPr lang="en-ZA"/>
           </a:p>
@@ -12416,8 +12416,8 @@
           <a:chExt cx="0" cy="0"/>
         </a:xfrm>
       </p:grpSpPr>
-      <mc:AlternateContent xmlns:mc="http://schemas.openxmlformats.org/markup-compatibility/2006">
-        <mc:Choice xmlns:p14="http://schemas.microsoft.com/office/powerpoint/2010/main" xmlns:aink="http://schemas.microsoft.com/office/drawing/2016/ink" Requires="p14 aink">
+      <mc:AlternateContent xmlns:mc="http://schemas.openxmlformats.org/markup-compatibility/2006" xmlns:p14="http://schemas.microsoft.com/office/powerpoint/2010/main" xmlns:aink="http://schemas.microsoft.com/office/drawing/2016/ink">
+        <mc:Choice Requires="p14 aink">
           <p:contentPart p14:bwMode="auto" r:id="rId2">
             <p14:nvContentPartPr>
               <p14:cNvPr id="2" name="Ink 1">
@@ -12436,7 +12436,7 @@
             </p14:xfrm>
           </p:contentPart>
         </mc:Choice>
-        <mc:Fallback>
+        <mc:Fallback xmlns="">
           <p:pic>
             <p:nvPicPr>
               <p:cNvPr id="2" name="Ink 1">
@@ -12467,8 +12467,8 @@
           </p:pic>
         </mc:Fallback>
       </mc:AlternateContent>
-      <mc:AlternateContent xmlns:mc="http://schemas.openxmlformats.org/markup-compatibility/2006">
-        <mc:Choice xmlns:p14="http://schemas.microsoft.com/office/powerpoint/2010/main" xmlns:aink="http://schemas.microsoft.com/office/drawing/2016/ink" Requires="p14 aink">
+      <mc:AlternateContent xmlns:mc="http://schemas.openxmlformats.org/markup-compatibility/2006" xmlns:p14="http://schemas.microsoft.com/office/powerpoint/2010/main" xmlns:aink="http://schemas.microsoft.com/office/drawing/2016/ink">
+        <mc:Choice Requires="p14 aink">
           <p:contentPart p14:bwMode="auto" r:id="rId4">
             <p14:nvContentPartPr>
               <p14:cNvPr id="6" name="Ink 5">
@@ -12487,7 +12487,7 @@
             </p14:xfrm>
           </p:contentPart>
         </mc:Choice>
-        <mc:Fallback>
+        <mc:Fallback xmlns="">
           <p:pic>
             <p:nvPicPr>
               <p:cNvPr id="6" name="Ink 5">
@@ -12518,8 +12518,8 @@
           </p:pic>
         </mc:Fallback>
       </mc:AlternateContent>
-      <mc:AlternateContent xmlns:mc="http://schemas.openxmlformats.org/markup-compatibility/2006">
-        <mc:Choice xmlns:p14="http://schemas.microsoft.com/office/powerpoint/2010/main" xmlns:aink="http://schemas.microsoft.com/office/drawing/2016/ink" Requires="p14 aink">
+      <mc:AlternateContent xmlns:mc="http://schemas.openxmlformats.org/markup-compatibility/2006" xmlns:p14="http://schemas.microsoft.com/office/powerpoint/2010/main" xmlns:aink="http://schemas.microsoft.com/office/drawing/2016/ink">
+        <mc:Choice Requires="p14 aink">
           <p:contentPart p14:bwMode="auto" r:id="rId6">
             <p14:nvContentPartPr>
               <p14:cNvPr id="10" name="Ink 9">
@@ -12538,7 +12538,7 @@
             </p14:xfrm>
           </p:contentPart>
         </mc:Choice>
-        <mc:Fallback>
+        <mc:Fallback xmlns="">
           <p:pic>
             <p:nvPicPr>
               <p:cNvPr id="10" name="Ink 9">
@@ -12569,8 +12569,8 @@
           </p:pic>
         </mc:Fallback>
       </mc:AlternateContent>
-      <mc:AlternateContent xmlns:mc="http://schemas.openxmlformats.org/markup-compatibility/2006">
-        <mc:Choice xmlns:p14="http://schemas.microsoft.com/office/powerpoint/2010/main" xmlns:aink="http://schemas.microsoft.com/office/drawing/2016/ink" Requires="p14 aink">
+      <mc:AlternateContent xmlns:mc="http://schemas.openxmlformats.org/markup-compatibility/2006" xmlns:p14="http://schemas.microsoft.com/office/powerpoint/2010/main" xmlns:aink="http://schemas.microsoft.com/office/drawing/2016/ink">
+        <mc:Choice Requires="p14 aink">
           <p:contentPart p14:bwMode="auto" r:id="rId8">
             <p14:nvContentPartPr>
               <p14:cNvPr id="12" name="Ink 11">
@@ -12589,7 +12589,7 @@
             </p14:xfrm>
           </p:contentPart>
         </mc:Choice>
-        <mc:Fallback>
+        <mc:Fallback xmlns="">
           <p:pic>
             <p:nvPicPr>
               <p:cNvPr id="12" name="Ink 11">
@@ -12620,8 +12620,8 @@
           </p:pic>
         </mc:Fallback>
       </mc:AlternateContent>
-      <mc:AlternateContent xmlns:mc="http://schemas.openxmlformats.org/markup-compatibility/2006">
-        <mc:Choice xmlns:p14="http://schemas.microsoft.com/office/powerpoint/2010/main" xmlns:aink="http://schemas.microsoft.com/office/drawing/2016/ink" Requires="p14 aink">
+      <mc:AlternateContent xmlns:mc="http://schemas.openxmlformats.org/markup-compatibility/2006" xmlns:p14="http://schemas.microsoft.com/office/powerpoint/2010/main" xmlns:aink="http://schemas.microsoft.com/office/drawing/2016/ink">
+        <mc:Choice Requires="p14 aink">
           <p:contentPart p14:bwMode="auto" r:id="rId10">
             <p14:nvContentPartPr>
               <p14:cNvPr id="14" name="Ink 13">
@@ -12640,7 +12640,7 @@
             </p14:xfrm>
           </p:contentPart>
         </mc:Choice>
-        <mc:Fallback>
+        <mc:Fallback xmlns="">
           <p:pic>
             <p:nvPicPr>
               <p:cNvPr id="14" name="Ink 13">
@@ -12691,8 +12691,8 @@
             <a:chExt cx="2630520" cy="3638160"/>
           </a:xfrm>
         </p:grpSpPr>
-        <mc:AlternateContent xmlns:mc="http://schemas.openxmlformats.org/markup-compatibility/2006">
-          <mc:Choice xmlns:p14="http://schemas.microsoft.com/office/powerpoint/2010/main" xmlns:aink="http://schemas.microsoft.com/office/drawing/2016/ink" Requires="p14 aink">
+        <mc:AlternateContent xmlns:mc="http://schemas.openxmlformats.org/markup-compatibility/2006" xmlns:p14="http://schemas.microsoft.com/office/powerpoint/2010/main" xmlns:aink="http://schemas.microsoft.com/office/drawing/2016/ink">
+          <mc:Choice Requires="p14 aink">
             <p:contentPart p14:bwMode="auto" r:id="rId12">
               <p14:nvContentPartPr>
                 <p14:cNvPr id="27" name="Ink 26">
@@ -12711,7 +12711,7 @@
               </p14:xfrm>
             </p:contentPart>
           </mc:Choice>
-          <mc:Fallback>
+          <mc:Fallback xmlns="">
             <p:pic>
               <p:nvPicPr>
                 <p:cNvPr id="27" name="Ink 26">
@@ -12742,8 +12742,8 @@
             </p:pic>
           </mc:Fallback>
         </mc:AlternateContent>
-        <mc:AlternateContent xmlns:mc="http://schemas.openxmlformats.org/markup-compatibility/2006">
-          <mc:Choice xmlns:p14="http://schemas.microsoft.com/office/powerpoint/2010/main" xmlns:aink="http://schemas.microsoft.com/office/drawing/2016/ink" Requires="p14 aink">
+        <mc:AlternateContent xmlns:mc="http://schemas.openxmlformats.org/markup-compatibility/2006" xmlns:p14="http://schemas.microsoft.com/office/powerpoint/2010/main" xmlns:aink="http://schemas.microsoft.com/office/drawing/2016/ink">
+          <mc:Choice Requires="p14 aink">
             <p:contentPart p14:bwMode="auto" r:id="rId14">
               <p14:nvContentPartPr>
                 <p14:cNvPr id="29" name="Ink 28">
@@ -12762,7 +12762,7 @@
               </p14:xfrm>
             </p:contentPart>
           </mc:Choice>
-          <mc:Fallback>
+          <mc:Fallback xmlns="">
             <p:pic>
               <p:nvPicPr>
                 <p:cNvPr id="29" name="Ink 28">
@@ -12793,8 +12793,8 @@
             </p:pic>
           </mc:Fallback>
         </mc:AlternateContent>
-        <mc:AlternateContent xmlns:mc="http://schemas.openxmlformats.org/markup-compatibility/2006">
-          <mc:Choice xmlns:p14="http://schemas.microsoft.com/office/powerpoint/2010/main" xmlns:aink="http://schemas.microsoft.com/office/drawing/2016/ink" Requires="p14 aink">
+        <mc:AlternateContent xmlns:mc="http://schemas.openxmlformats.org/markup-compatibility/2006" xmlns:p14="http://schemas.microsoft.com/office/powerpoint/2010/main" xmlns:aink="http://schemas.microsoft.com/office/drawing/2016/ink">
+          <mc:Choice Requires="p14 aink">
             <p:contentPart p14:bwMode="auto" r:id="rId16">
               <p14:nvContentPartPr>
                 <p14:cNvPr id="30" name="Ink 29">
@@ -12813,7 +12813,7 @@
               </p14:xfrm>
             </p:contentPart>
           </mc:Choice>
-          <mc:Fallback>
+          <mc:Fallback xmlns="">
             <p:pic>
               <p:nvPicPr>
                 <p:cNvPr id="30" name="Ink 29">
@@ -12865,8 +12865,8 @@
             <a:chExt cx="1433520" cy="2112120"/>
           </a:xfrm>
         </p:grpSpPr>
-        <mc:AlternateContent xmlns:mc="http://schemas.openxmlformats.org/markup-compatibility/2006">
-          <mc:Choice xmlns:p14="http://schemas.microsoft.com/office/powerpoint/2010/main" xmlns:aink="http://schemas.microsoft.com/office/drawing/2016/ink" Requires="p14 aink">
+        <mc:AlternateContent xmlns:mc="http://schemas.openxmlformats.org/markup-compatibility/2006" xmlns:p14="http://schemas.microsoft.com/office/powerpoint/2010/main" xmlns:aink="http://schemas.microsoft.com/office/drawing/2016/ink">
+          <mc:Choice Requires="p14 aink">
             <p:contentPart p14:bwMode="auto" r:id="rId18">
               <p14:nvContentPartPr>
                 <p14:cNvPr id="32" name="Ink 31">
@@ -12885,7 +12885,7 @@
               </p14:xfrm>
             </p:contentPart>
           </mc:Choice>
-          <mc:Fallback>
+          <mc:Fallback xmlns="">
             <p:pic>
               <p:nvPicPr>
                 <p:cNvPr id="32" name="Ink 31">
@@ -12916,8 +12916,8 @@
             </p:pic>
           </mc:Fallback>
         </mc:AlternateContent>
-        <mc:AlternateContent xmlns:mc="http://schemas.openxmlformats.org/markup-compatibility/2006">
-          <mc:Choice xmlns:p14="http://schemas.microsoft.com/office/powerpoint/2010/main" xmlns:aink="http://schemas.microsoft.com/office/drawing/2016/ink" Requires="p14 aink">
+        <mc:AlternateContent xmlns:mc="http://schemas.openxmlformats.org/markup-compatibility/2006" xmlns:p14="http://schemas.microsoft.com/office/powerpoint/2010/main" xmlns:aink="http://schemas.microsoft.com/office/drawing/2016/ink">
+          <mc:Choice Requires="p14 aink">
             <p:contentPart p14:bwMode="auto" r:id="rId20">
               <p14:nvContentPartPr>
                 <p14:cNvPr id="36" name="Ink 35">
@@ -12936,7 +12936,7 @@
               </p14:xfrm>
             </p:contentPart>
           </mc:Choice>
-          <mc:Fallback>
+          <mc:Fallback xmlns="">
             <p:pic>
               <p:nvPicPr>
                 <p:cNvPr id="36" name="Ink 35">
@@ -12967,8 +12967,8 @@
             </p:pic>
           </mc:Fallback>
         </mc:AlternateContent>
-        <mc:AlternateContent xmlns:mc="http://schemas.openxmlformats.org/markup-compatibility/2006">
-          <mc:Choice xmlns:p14="http://schemas.microsoft.com/office/powerpoint/2010/main" xmlns:aink="http://schemas.microsoft.com/office/drawing/2016/ink" Requires="p14 aink">
+        <mc:AlternateContent xmlns:mc="http://schemas.openxmlformats.org/markup-compatibility/2006" xmlns:p14="http://schemas.microsoft.com/office/powerpoint/2010/main" xmlns:aink="http://schemas.microsoft.com/office/drawing/2016/ink">
+          <mc:Choice Requires="p14 aink">
             <p:contentPart p14:bwMode="auto" r:id="rId22">
               <p14:nvContentPartPr>
                 <p14:cNvPr id="38" name="Ink 37">
@@ -12987,7 +12987,7 @@
               </p14:xfrm>
             </p:contentPart>
           </mc:Choice>
-          <mc:Fallback>
+          <mc:Fallback xmlns="">
             <p:pic>
               <p:nvPicPr>
                 <p:cNvPr id="38" name="Ink 37">
@@ -13039,8 +13039,8 @@
             <a:chExt cx="2630520" cy="3638160"/>
           </a:xfrm>
         </p:grpSpPr>
-        <mc:AlternateContent xmlns:mc="http://schemas.openxmlformats.org/markup-compatibility/2006">
-          <mc:Choice xmlns:p14="http://schemas.microsoft.com/office/powerpoint/2010/main" xmlns:aink="http://schemas.microsoft.com/office/drawing/2016/ink" Requires="p14 aink">
+        <mc:AlternateContent xmlns:mc="http://schemas.openxmlformats.org/markup-compatibility/2006" xmlns:p14="http://schemas.microsoft.com/office/powerpoint/2010/main" xmlns:aink="http://schemas.microsoft.com/office/drawing/2016/ink">
+          <mc:Choice Requires="p14 aink">
             <p:contentPart p14:bwMode="auto" r:id="rId24">
               <p14:nvContentPartPr>
                 <p14:cNvPr id="42" name="Ink 41">
@@ -13059,7 +13059,7 @@
               </p14:xfrm>
             </p:contentPart>
           </mc:Choice>
-          <mc:Fallback>
+          <mc:Fallback xmlns="">
             <p:pic>
               <p:nvPicPr>
                 <p:cNvPr id="42" name="Ink 41">
@@ -13090,8 +13090,8 @@
             </p:pic>
           </mc:Fallback>
         </mc:AlternateContent>
-        <mc:AlternateContent xmlns:mc="http://schemas.openxmlformats.org/markup-compatibility/2006">
-          <mc:Choice xmlns:p14="http://schemas.microsoft.com/office/powerpoint/2010/main" xmlns:aink="http://schemas.microsoft.com/office/drawing/2016/ink" Requires="p14 aink">
+        <mc:AlternateContent xmlns:mc="http://schemas.openxmlformats.org/markup-compatibility/2006" xmlns:p14="http://schemas.microsoft.com/office/powerpoint/2010/main" xmlns:aink="http://schemas.microsoft.com/office/drawing/2016/ink">
+          <mc:Choice Requires="p14 aink">
             <p:contentPart p14:bwMode="auto" r:id="rId26">
               <p14:nvContentPartPr>
                 <p14:cNvPr id="43" name="Ink 42">
@@ -13110,7 +13110,7 @@
               </p14:xfrm>
             </p:contentPart>
           </mc:Choice>
-          <mc:Fallback>
+          <mc:Fallback xmlns="">
             <p:pic>
               <p:nvPicPr>
                 <p:cNvPr id="43" name="Ink 42">
@@ -13141,8 +13141,8 @@
             </p:pic>
           </mc:Fallback>
         </mc:AlternateContent>
-        <mc:AlternateContent xmlns:mc="http://schemas.openxmlformats.org/markup-compatibility/2006">
-          <mc:Choice xmlns:p14="http://schemas.microsoft.com/office/powerpoint/2010/main" xmlns:aink="http://schemas.microsoft.com/office/drawing/2016/ink" Requires="p14 aink">
+        <mc:AlternateContent xmlns:mc="http://schemas.openxmlformats.org/markup-compatibility/2006" xmlns:p14="http://schemas.microsoft.com/office/powerpoint/2010/main" xmlns:aink="http://schemas.microsoft.com/office/drawing/2016/ink">
+          <mc:Choice Requires="p14 aink">
             <p:contentPart p14:bwMode="auto" r:id="rId28">
               <p14:nvContentPartPr>
                 <p14:cNvPr id="44" name="Ink 43">
@@ -13161,7 +13161,7 @@
               </p14:xfrm>
             </p:contentPart>
           </mc:Choice>
-          <mc:Fallback>
+          <mc:Fallback xmlns="">
             <p:pic>
               <p:nvPicPr>
                 <p:cNvPr id="44" name="Ink 43">
@@ -13213,8 +13213,8 @@
             <a:chExt cx="1433520" cy="2112120"/>
           </a:xfrm>
         </p:grpSpPr>
-        <mc:AlternateContent xmlns:mc="http://schemas.openxmlformats.org/markup-compatibility/2006">
-          <mc:Choice xmlns:p14="http://schemas.microsoft.com/office/powerpoint/2010/main" xmlns:aink="http://schemas.microsoft.com/office/drawing/2016/ink" Requires="p14 aink">
+        <mc:AlternateContent xmlns:mc="http://schemas.openxmlformats.org/markup-compatibility/2006" xmlns:p14="http://schemas.microsoft.com/office/powerpoint/2010/main" xmlns:aink="http://schemas.microsoft.com/office/drawing/2016/ink">
+          <mc:Choice Requires="p14 aink">
             <p:contentPart p14:bwMode="auto" r:id="rId30">
               <p14:nvContentPartPr>
                 <p14:cNvPr id="47" name="Ink 46">
@@ -13233,7 +13233,7 @@
               </p14:xfrm>
             </p:contentPart>
           </mc:Choice>
-          <mc:Fallback>
+          <mc:Fallback xmlns="">
             <p:pic>
               <p:nvPicPr>
                 <p:cNvPr id="47" name="Ink 46">
@@ -13264,8 +13264,8 @@
             </p:pic>
           </mc:Fallback>
         </mc:AlternateContent>
-        <mc:AlternateContent xmlns:mc="http://schemas.openxmlformats.org/markup-compatibility/2006">
-          <mc:Choice xmlns:p14="http://schemas.microsoft.com/office/powerpoint/2010/main" xmlns:aink="http://schemas.microsoft.com/office/drawing/2016/ink" Requires="p14 aink">
+        <mc:AlternateContent xmlns:mc="http://schemas.openxmlformats.org/markup-compatibility/2006" xmlns:p14="http://schemas.microsoft.com/office/powerpoint/2010/main" xmlns:aink="http://schemas.microsoft.com/office/drawing/2016/ink">
+          <mc:Choice Requires="p14 aink">
             <p:contentPart p14:bwMode="auto" r:id="rId32">
               <p14:nvContentPartPr>
                 <p14:cNvPr id="49" name="Ink 48">
@@ -13284,7 +13284,7 @@
               </p14:xfrm>
             </p:contentPart>
           </mc:Choice>
-          <mc:Fallback>
+          <mc:Fallback xmlns="">
             <p:pic>
               <p:nvPicPr>
                 <p:cNvPr id="49" name="Ink 48">
@@ -13315,8 +13315,8 @@
             </p:pic>
           </mc:Fallback>
         </mc:AlternateContent>
-        <mc:AlternateContent xmlns:mc="http://schemas.openxmlformats.org/markup-compatibility/2006">
-          <mc:Choice xmlns:p14="http://schemas.microsoft.com/office/powerpoint/2010/main" xmlns:aink="http://schemas.microsoft.com/office/drawing/2016/ink" Requires="p14 aink">
+        <mc:AlternateContent xmlns:mc="http://schemas.openxmlformats.org/markup-compatibility/2006" xmlns:p14="http://schemas.microsoft.com/office/powerpoint/2010/main" xmlns:aink="http://schemas.microsoft.com/office/drawing/2016/ink">
+          <mc:Choice Requires="p14 aink">
             <p:contentPart p14:bwMode="auto" r:id="rId34">
               <p14:nvContentPartPr>
                 <p14:cNvPr id="50" name="Ink 49">
@@ -13335,7 +13335,7 @@
               </p14:xfrm>
             </p:contentPart>
           </mc:Choice>
-          <mc:Fallback>
+          <mc:Fallback xmlns="">
             <p:pic>
               <p:nvPicPr>
                 <p:cNvPr id="50" name="Ink 49">
@@ -13367,8 +13367,8 @@
           </mc:Fallback>
         </mc:AlternateContent>
       </p:grpSp>
-      <mc:AlternateContent xmlns:mc="http://schemas.openxmlformats.org/markup-compatibility/2006">
-        <mc:Choice xmlns:p14="http://schemas.microsoft.com/office/powerpoint/2010/main" xmlns:aink="http://schemas.microsoft.com/office/drawing/2016/ink" Requires="p14 aink">
+      <mc:AlternateContent xmlns:mc="http://schemas.openxmlformats.org/markup-compatibility/2006" xmlns:p14="http://schemas.microsoft.com/office/powerpoint/2010/main" xmlns:aink="http://schemas.microsoft.com/office/drawing/2016/ink">
+        <mc:Choice Requires="p14 aink">
           <p:contentPart p14:bwMode="auto" r:id="rId36">
             <p14:nvContentPartPr>
               <p14:cNvPr id="58" name="Ink 57">
@@ -13387,7 +13387,7 @@
             </p14:xfrm>
           </p:contentPart>
         </mc:Choice>
-        <mc:Fallback>
+        <mc:Fallback xmlns="">
           <p:pic>
             <p:nvPicPr>
               <p:cNvPr id="58" name="Ink 57">
@@ -13418,8 +13418,8 @@
           </p:pic>
         </mc:Fallback>
       </mc:AlternateContent>
-      <mc:AlternateContent xmlns:mc="http://schemas.openxmlformats.org/markup-compatibility/2006">
-        <mc:Choice xmlns:p14="http://schemas.microsoft.com/office/powerpoint/2010/main" xmlns:aink="http://schemas.microsoft.com/office/drawing/2016/ink" Requires="p14 aink">
+      <mc:AlternateContent xmlns:mc="http://schemas.openxmlformats.org/markup-compatibility/2006" xmlns:p14="http://schemas.microsoft.com/office/powerpoint/2010/main" xmlns:aink="http://schemas.microsoft.com/office/drawing/2016/ink">
+        <mc:Choice Requires="p14 aink">
           <p:contentPart p14:bwMode="auto" r:id="rId38">
             <p14:nvContentPartPr>
               <p14:cNvPr id="61" name="Ink 60">
@@ -13438,7 +13438,7 @@
             </p14:xfrm>
           </p:contentPart>
         </mc:Choice>
-        <mc:Fallback>
+        <mc:Fallback xmlns="">
           <p:pic>
             <p:nvPicPr>
               <p:cNvPr id="61" name="Ink 60">
@@ -13971,8 +13971,8 @@
             <a:chExt cx="304200" cy="186480"/>
           </a:xfrm>
         </p:grpSpPr>
-        <mc:AlternateContent xmlns:mc="http://schemas.openxmlformats.org/markup-compatibility/2006">
-          <mc:Choice xmlns:p14="http://schemas.microsoft.com/office/powerpoint/2010/main" xmlns:aink="http://schemas.microsoft.com/office/drawing/2016/ink" Requires="p14 aink">
+        <mc:AlternateContent xmlns:mc="http://schemas.openxmlformats.org/markup-compatibility/2006" xmlns:p14="http://schemas.microsoft.com/office/powerpoint/2010/main" xmlns:aink="http://schemas.microsoft.com/office/drawing/2016/ink">
+          <mc:Choice Requires="p14 aink">
             <p:contentPart p14:bwMode="auto" r:id="rId40">
               <p14:nvContentPartPr>
                 <p14:cNvPr id="17" name="Ink 16">
@@ -13991,7 +13991,7 @@
               </p14:xfrm>
             </p:contentPart>
           </mc:Choice>
-          <mc:Fallback>
+          <mc:Fallback xmlns="">
             <p:pic>
               <p:nvPicPr>
                 <p:cNvPr id="17" name="Ink 16">
@@ -14022,8 +14022,8 @@
             </p:pic>
           </mc:Fallback>
         </mc:AlternateContent>
-        <mc:AlternateContent xmlns:mc="http://schemas.openxmlformats.org/markup-compatibility/2006">
-          <mc:Choice xmlns:p14="http://schemas.microsoft.com/office/powerpoint/2010/main" xmlns:aink="http://schemas.microsoft.com/office/drawing/2016/ink" Requires="p14 aink">
+        <mc:AlternateContent xmlns:mc="http://schemas.openxmlformats.org/markup-compatibility/2006" xmlns:p14="http://schemas.microsoft.com/office/powerpoint/2010/main" xmlns:aink="http://schemas.microsoft.com/office/drawing/2016/ink">
+          <mc:Choice Requires="p14 aink">
             <p:contentPart p14:bwMode="auto" r:id="rId42">
               <p14:nvContentPartPr>
                 <p14:cNvPr id="18" name="Ink 17">
@@ -14042,7 +14042,7 @@
               </p14:xfrm>
             </p:contentPart>
           </mc:Choice>
-          <mc:Fallback>
+          <mc:Fallback xmlns="">
             <p:pic>
               <p:nvPicPr>
                 <p:cNvPr id="18" name="Ink 17">
@@ -14094,8 +14094,8 @@
             <a:chExt cx="340920" cy="157680"/>
           </a:xfrm>
         </p:grpSpPr>
-        <mc:AlternateContent xmlns:mc="http://schemas.openxmlformats.org/markup-compatibility/2006">
-          <mc:Choice xmlns:p14="http://schemas.microsoft.com/office/powerpoint/2010/main" xmlns:aink="http://schemas.microsoft.com/office/drawing/2016/ink" Requires="p14 aink">
+        <mc:AlternateContent xmlns:mc="http://schemas.openxmlformats.org/markup-compatibility/2006" xmlns:p14="http://schemas.microsoft.com/office/powerpoint/2010/main" xmlns:aink="http://schemas.microsoft.com/office/drawing/2016/ink">
+          <mc:Choice Requires="p14 aink">
             <p:contentPart p14:bwMode="auto" r:id="rId44">
               <p14:nvContentPartPr>
                 <p14:cNvPr id="20" name="Ink 19">
@@ -14114,7 +14114,7 @@
               </p14:xfrm>
             </p:contentPart>
           </mc:Choice>
-          <mc:Fallback>
+          <mc:Fallback xmlns="">
             <p:pic>
               <p:nvPicPr>
                 <p:cNvPr id="20" name="Ink 19">
@@ -14145,8 +14145,8 @@
             </p:pic>
           </mc:Fallback>
         </mc:AlternateContent>
-        <mc:AlternateContent xmlns:mc="http://schemas.openxmlformats.org/markup-compatibility/2006">
-          <mc:Choice xmlns:p14="http://schemas.microsoft.com/office/powerpoint/2010/main" xmlns:aink="http://schemas.microsoft.com/office/drawing/2016/ink" Requires="p14 aink">
+        <mc:AlternateContent xmlns:mc="http://schemas.openxmlformats.org/markup-compatibility/2006" xmlns:p14="http://schemas.microsoft.com/office/powerpoint/2010/main" xmlns:aink="http://schemas.microsoft.com/office/drawing/2016/ink">
+          <mc:Choice Requires="p14 aink">
             <p:contentPart p14:bwMode="auto" r:id="rId46">
               <p14:nvContentPartPr>
                 <p14:cNvPr id="21" name="Ink 20">
@@ -14165,7 +14165,7 @@
               </p14:xfrm>
             </p:contentPart>
           </mc:Choice>
-          <mc:Fallback>
+          <mc:Fallback xmlns="">
             <p:pic>
               <p:nvPicPr>
                 <p:cNvPr id="21" name="Ink 20">
@@ -14197,8 +14197,8 @@
           </mc:Fallback>
         </mc:AlternateContent>
       </p:grpSp>
-      <mc:AlternateContent xmlns:mc="http://schemas.openxmlformats.org/markup-compatibility/2006">
-        <mc:Choice xmlns:p14="http://schemas.microsoft.com/office/powerpoint/2010/main" xmlns:aink="http://schemas.microsoft.com/office/drawing/2016/ink" Requires="p14 aink">
+      <mc:AlternateContent xmlns:mc="http://schemas.openxmlformats.org/markup-compatibility/2006" xmlns:p14="http://schemas.microsoft.com/office/powerpoint/2010/main" xmlns:aink="http://schemas.microsoft.com/office/drawing/2016/ink">
+        <mc:Choice Requires="p14 aink">
           <p:contentPart p14:bwMode="auto" r:id="rId48">
             <p14:nvContentPartPr>
               <p14:cNvPr id="24" name="Ink 23">
@@ -14217,7 +14217,7 @@
             </p14:xfrm>
           </p:contentPart>
         </mc:Choice>
-        <mc:Fallback>
+        <mc:Fallback xmlns="">
           <p:pic>
             <p:nvPicPr>
               <p:cNvPr id="24" name="Ink 23">
@@ -14248,8 +14248,8 @@
           </p:pic>
         </mc:Fallback>
       </mc:AlternateContent>
-      <mc:AlternateContent xmlns:mc="http://schemas.openxmlformats.org/markup-compatibility/2006">
-        <mc:Choice xmlns:p14="http://schemas.microsoft.com/office/powerpoint/2010/main" xmlns:aink="http://schemas.microsoft.com/office/drawing/2016/ink" Requires="p14 aink">
+      <mc:AlternateContent xmlns:mc="http://schemas.openxmlformats.org/markup-compatibility/2006" xmlns:p14="http://schemas.microsoft.com/office/powerpoint/2010/main" xmlns:aink="http://schemas.microsoft.com/office/drawing/2016/ink">
+        <mc:Choice Requires="p14 aink">
           <p:contentPart p14:bwMode="auto" r:id="rId50">
             <p14:nvContentPartPr>
               <p14:cNvPr id="25" name="Ink 24">
@@ -14268,7 +14268,7 @@
             </p14:xfrm>
           </p:contentPart>
         </mc:Choice>
-        <mc:Fallback>
+        <mc:Fallback xmlns="">
           <p:pic>
             <p:nvPicPr>
               <p:cNvPr id="25" name="Ink 24">
@@ -14319,8 +14319,8 @@
             <a:chExt cx="275040" cy="231120"/>
           </a:xfrm>
         </p:grpSpPr>
-        <mc:AlternateContent xmlns:mc="http://schemas.openxmlformats.org/markup-compatibility/2006">
-          <mc:Choice xmlns:p14="http://schemas.microsoft.com/office/powerpoint/2010/main" xmlns:aink="http://schemas.microsoft.com/office/drawing/2016/ink" Requires="p14 aink">
+        <mc:AlternateContent xmlns:mc="http://schemas.openxmlformats.org/markup-compatibility/2006" xmlns:p14="http://schemas.microsoft.com/office/powerpoint/2010/main" xmlns:aink="http://schemas.microsoft.com/office/drawing/2016/ink">
+          <mc:Choice Requires="p14 aink">
             <p:contentPart p14:bwMode="auto" r:id="rId52">
               <p14:nvContentPartPr>
                 <p14:cNvPr id="26" name="Ink 25">
@@ -14339,7 +14339,7 @@
               </p14:xfrm>
             </p:contentPart>
           </mc:Choice>
-          <mc:Fallback>
+          <mc:Fallback xmlns="">
             <p:pic>
               <p:nvPicPr>
                 <p:cNvPr id="26" name="Ink 25">
@@ -14370,8 +14370,8 @@
             </p:pic>
           </mc:Fallback>
         </mc:AlternateContent>
-        <mc:AlternateContent xmlns:mc="http://schemas.openxmlformats.org/markup-compatibility/2006">
-          <mc:Choice xmlns:p14="http://schemas.microsoft.com/office/powerpoint/2010/main" xmlns:aink="http://schemas.microsoft.com/office/drawing/2016/ink" Requires="p14 aink">
+        <mc:AlternateContent xmlns:mc="http://schemas.openxmlformats.org/markup-compatibility/2006" xmlns:p14="http://schemas.microsoft.com/office/powerpoint/2010/main" xmlns:aink="http://schemas.microsoft.com/office/drawing/2016/ink">
+          <mc:Choice Requires="p14 aink">
             <p:contentPart p14:bwMode="auto" r:id="rId54">
               <p14:nvContentPartPr>
                 <p14:cNvPr id="28" name="Ink 27">
@@ -14390,7 +14390,7 @@
               </p14:xfrm>
             </p:contentPart>
           </mc:Choice>
-          <mc:Fallback>
+          <mc:Fallback xmlns="">
             <p:pic>
               <p:nvPicPr>
                 <p:cNvPr id="28" name="Ink 27">
@@ -14422,8 +14422,8 @@
           </mc:Fallback>
         </mc:AlternateContent>
       </p:grpSp>
-      <mc:AlternateContent xmlns:mc="http://schemas.openxmlformats.org/markup-compatibility/2006">
-        <mc:Choice xmlns:p14="http://schemas.microsoft.com/office/powerpoint/2010/main" xmlns:aink="http://schemas.microsoft.com/office/drawing/2016/ink" Requires="p14 aink">
+      <mc:AlternateContent xmlns:mc="http://schemas.openxmlformats.org/markup-compatibility/2006" xmlns:p14="http://schemas.microsoft.com/office/powerpoint/2010/main" xmlns:aink="http://schemas.microsoft.com/office/drawing/2016/ink">
+        <mc:Choice Requires="p14 aink">
           <p:contentPart p14:bwMode="auto" r:id="rId56">
             <p14:nvContentPartPr>
               <p14:cNvPr id="34" name="Ink 33">
@@ -14442,7 +14442,7 @@
             </p14:xfrm>
           </p:contentPart>
         </mc:Choice>
-        <mc:Fallback>
+        <mc:Fallback xmlns="">
           <p:pic>
             <p:nvPicPr>
               <p:cNvPr id="34" name="Ink 33">
@@ -14473,8 +14473,8 @@
           </p:pic>
         </mc:Fallback>
       </mc:AlternateContent>
-      <mc:AlternateContent xmlns:mc="http://schemas.openxmlformats.org/markup-compatibility/2006">
-        <mc:Choice xmlns:p14="http://schemas.microsoft.com/office/powerpoint/2010/main" xmlns:aink="http://schemas.microsoft.com/office/drawing/2016/ink" Requires="p14 aink">
+      <mc:AlternateContent xmlns:mc="http://schemas.openxmlformats.org/markup-compatibility/2006" xmlns:p14="http://schemas.microsoft.com/office/powerpoint/2010/main" xmlns:aink="http://schemas.microsoft.com/office/drawing/2016/ink">
+        <mc:Choice Requires="p14 aink">
           <p:contentPart p14:bwMode="auto" r:id="rId58">
             <p14:nvContentPartPr>
               <p14:cNvPr id="46" name="Ink 45">
@@ -14493,7 +14493,7 @@
             </p14:xfrm>
           </p:contentPart>
         </mc:Choice>
-        <mc:Fallback>
+        <mc:Fallback xmlns="">
           <p:pic>
             <p:nvPicPr>
               <p:cNvPr id="46" name="Ink 45">
@@ -14524,6 +14524,81 @@
           </p:pic>
         </mc:Fallback>
       </mc:AlternateContent>
+      <p:sp>
+        <p:nvSpPr>
+          <p:cNvPr id="13" name="TextBox 12">
+            <a:extLst>
+              <a:ext uri="{FF2B5EF4-FFF2-40B4-BE49-F238E27FC236}">
+                <a16:creationId xmlns:a16="http://schemas.microsoft.com/office/drawing/2014/main" id="{D672821D-6BD5-53D0-250D-B69EE8ED398D}"/>
+              </a:ext>
+            </a:extLst>
+          </p:cNvPr>
+          <p:cNvSpPr txBox="1"/>
+          <p:nvPr/>
+        </p:nvSpPr>
+        <p:spPr>
+          <a:xfrm>
+            <a:off x="7669448" y="6306970"/>
+            <a:ext cx="5004407" cy="646331"/>
+          </a:xfrm>
+          <a:prstGeom prst="rect">
+            <a:avLst/>
+          </a:prstGeom>
+          <a:noFill/>
+        </p:spPr>
+        <p:txBody>
+          <a:bodyPr wrap="square" rtlCol="0">
+            <a:spAutoFit/>
+          </a:bodyPr>
+          <a:lstStyle/>
+          <a:p>
+            <a:r>
+              <a:rPr lang="en-ZA" dirty="0">
+                <a:solidFill>
+                  <a:schemeClr val="bg1"/>
+                </a:solidFill>
+                <a:latin typeface="Segoe Print" panose="02000600000000000000" pitchFamily="2" charset="0"/>
+              </a:rPr>
+              <a:t>Data Source: </a:t>
+            </a:r>
+            <a:r>
+              <a:rPr lang="en-ZA" dirty="0" err="1">
+                <a:solidFill>
+                  <a:schemeClr val="bg1"/>
+                </a:solidFill>
+                <a:latin typeface="Segoe Print" panose="02000600000000000000" pitchFamily="2" charset="0"/>
+              </a:rPr>
+              <a:t>Fbref</a:t>
+            </a:r>
+            <a:r>
+              <a:rPr lang="en-ZA" dirty="0">
+                <a:solidFill>
+                  <a:schemeClr val="bg1"/>
+                </a:solidFill>
+                <a:latin typeface="Segoe Print" panose="02000600000000000000" pitchFamily="2" charset="0"/>
+              </a:rPr>
+              <a:t>, 2024-25 season</a:t>
+            </a:r>
+            <a:br>
+              <a:rPr lang="en-ZA" dirty="0">
+                <a:solidFill>
+                  <a:schemeClr val="bg1"/>
+                </a:solidFill>
+                <a:latin typeface="Segoe Print" panose="02000600000000000000" pitchFamily="2" charset="0"/>
+              </a:rPr>
+            </a:br>
+            <a:r>
+              <a:rPr lang="en-ZA" dirty="0">
+                <a:solidFill>
+                  <a:schemeClr val="bg1"/>
+                </a:solidFill>
+                <a:latin typeface="Segoe Print" panose="02000600000000000000" pitchFamily="2" charset="0"/>
+              </a:rPr>
+              <a:t>Min. 1800 Mins</a:t>
+            </a:r>
+          </a:p>
+        </p:txBody>
+      </p:sp>
     </p:spTree>
     <p:extLst>
       <p:ext uri="{BB962C8B-B14F-4D97-AF65-F5344CB8AC3E}">

</xml_diff>